<commit_message>
added to problem statement
</commit_message>
<xml_diff>
--- a/Ai Final persentation.pptx
+++ b/Ai Final persentation.pptx
@@ -5,11 +5,12 @@
     <p:sldMasterId id="2147483659" r:id="rId1"/>
   </p:sldMasterIdLst>
   <p:notesMasterIdLst>
-    <p:notesMasterId r:id="rId4"/>
+    <p:notesMasterId r:id="rId5"/>
   </p:notesMasterIdLst>
   <p:sldIdLst>
     <p:sldId id="256" r:id="rId2"/>
     <p:sldId id="257" r:id="rId3"/>
+    <p:sldId id="258" r:id="rId4"/>
   </p:sldIdLst>
   <p:sldSz cx="9144000" cy="5143500" type="screen16x9"/>
   <p:notesSz cx="6858000" cy="9144000"/>
@@ -5959,10 +5960,115 @@
               <a:rPr lang="en" dirty="0"/>
               <a:t>sing data from previous playthroughs the game will adapt based on how well the player did.</a:t>
             </a:r>
-            <a:endParaRPr dirty="0"/>
           </a:p>
           <a:p>
             <a:pPr marL="0" lvl="0" indent="0" algn="l" rtl="0">
+              <a:lnSpc>
+                <a:spcPct val="100000"/>
+              </a:lnSpc>
+              <a:spcBef>
+                <a:spcPts val="1600"/>
+              </a:spcBef>
+              <a:spcAft>
+                <a:spcPts val="0"/>
+              </a:spcAft>
+              <a:buNone/>
+            </a:pPr>
+            <a:r>
+              <a:rPr lang="en" dirty="0"/>
+              <a:t>-</a:t>
+            </a:r>
+            <a:r>
+              <a:rPr lang="en-US" dirty="0"/>
+              <a:t>D</a:t>
+            </a:r>
+            <a:r>
+              <a:rPr lang="en" dirty="0"/>
+              <a:t>ata </a:t>
+            </a:r>
+            <a:r>
+              <a:rPr lang="en-US" dirty="0"/>
+              <a:t>will be comparing player time to beat the level to what time we want the players to beat the level</a:t>
+            </a:r>
+            <a:endParaRPr lang="en" dirty="0"/>
+          </a:p>
+        </p:txBody>
+      </p:sp>
+    </p:spTree>
+  </p:cSld>
+  <p:clrMapOvr>
+    <a:masterClrMapping/>
+  </p:clrMapOvr>
+</p:sld>
+</file>
+
+<file path=ppt/slides/slide3.xml><?xml version="1.0" encoding="utf-8"?>
+<p:sld xmlns:a="http://schemas.openxmlformats.org/drawingml/2006/main" xmlns:r="http://schemas.openxmlformats.org/officeDocument/2006/relationships" xmlns:p="http://schemas.openxmlformats.org/presentationml/2006/main">
+  <p:cSld>
+    <p:spTree>
+      <p:nvGrpSpPr>
+        <p:cNvPr id="1" name=""/>
+        <p:cNvGrpSpPr/>
+        <p:nvPr/>
+      </p:nvGrpSpPr>
+      <p:grpSpPr>
+        <a:xfrm>
+          <a:off x="0" y="0"/>
+          <a:ext cx="0" cy="0"/>
+          <a:chOff x="0" y="0"/>
+          <a:chExt cx="0" cy="0"/>
+        </a:xfrm>
+      </p:grpSpPr>
+      <p:sp>
+        <p:nvSpPr>
+          <p:cNvPr id="2" name="Title 1">
+            <a:extLst>
+              <a:ext uri="{FF2B5EF4-FFF2-40B4-BE49-F238E27FC236}">
+                <a16:creationId xmlns:a16="http://schemas.microsoft.com/office/drawing/2014/main" id="{16F37AB4-DDDD-44ED-B2A7-105914802B37}"/>
+              </a:ext>
+            </a:extLst>
+          </p:cNvPr>
+          <p:cNvSpPr>
+            <a:spLocks noGrp="1"/>
+          </p:cNvSpPr>
+          <p:nvPr>
+            <p:ph type="title"/>
+          </p:nvPr>
+        </p:nvSpPr>
+        <p:spPr/>
+        <p:txBody>
+          <a:bodyPr/>
+          <a:lstStyle/>
+          <a:p>
+            <a:r>
+              <a:rPr lang="en-US" dirty="0"/>
+              <a:t>Continued</a:t>
+            </a:r>
+          </a:p>
+        </p:txBody>
+      </p:sp>
+      <p:sp>
+        <p:nvSpPr>
+          <p:cNvPr id="3" name="Text Placeholder 2">
+            <a:extLst>
+              <a:ext uri="{FF2B5EF4-FFF2-40B4-BE49-F238E27FC236}">
+                <a16:creationId xmlns:a16="http://schemas.microsoft.com/office/drawing/2014/main" id="{8EA1E525-3D01-4D0E-AAEE-DE2216E9CA80}"/>
+              </a:ext>
+            </a:extLst>
+          </p:cNvPr>
+          <p:cNvSpPr>
+            <a:spLocks noGrp="1"/>
+          </p:cNvSpPr>
+          <p:nvPr>
+            <p:ph type="body" idx="1"/>
+          </p:nvPr>
+        </p:nvSpPr>
+        <p:spPr/>
+        <p:txBody>
+          <a:bodyPr/>
+          <a:lstStyle/>
+          <a:p>
+            <a:pPr marL="0" lvl="0" indent="0">
               <a:lnSpc>
                 <a:spcPct val="100000"/>
               </a:lnSpc>
@@ -5996,7 +6102,7 @@
             </a:r>
           </a:p>
           <a:p>
-            <a:pPr marL="0" lvl="0" indent="0" algn="l" rtl="0">
+            <a:pPr marL="0" lvl="0" indent="0">
               <a:lnSpc>
                 <a:spcPct val="100000"/>
               </a:lnSpc>
@@ -6013,9 +6119,20 @@
               <a:t>- Using C# as the scripting language</a:t>
             </a:r>
           </a:p>
+          <a:p>
+            <a:pPr marL="114300" indent="0">
+              <a:buNone/>
+            </a:pPr>
+            <a:endParaRPr lang="en-US" dirty="0"/>
+          </a:p>
         </p:txBody>
       </p:sp>
     </p:spTree>
+    <p:extLst>
+      <p:ext uri="{BB962C8B-B14F-4D97-AF65-F5344CB8AC3E}">
+        <p14:creationId xmlns:p14="http://schemas.microsoft.com/office/powerpoint/2010/main" val="3129993071"/>
+      </p:ext>
+    </p:extLst>
   </p:cSld>
   <p:clrMapOvr>
     <a:masterClrMapping/>

</xml_diff>

<commit_message>
Update Ai Final persentation.pptx
with more correct information
</commit_message>
<xml_diff>
--- a/Ai Final persentation.pptx
+++ b/Ai Final persentation.pptx
@@ -5,12 +5,13 @@
     <p:sldMasterId id="2147483659" r:id="rId1"/>
   </p:sldMasterIdLst>
   <p:notesMasterIdLst>
-    <p:notesMasterId r:id="rId5"/>
+    <p:notesMasterId r:id="rId6"/>
   </p:notesMasterIdLst>
   <p:sldIdLst>
     <p:sldId id="256" r:id="rId2"/>
     <p:sldId id="257" r:id="rId3"/>
     <p:sldId id="258" r:id="rId4"/>
+    <p:sldId id="259" r:id="rId5"/>
   </p:sldIdLst>
   <p:sldSz cx="9144000" cy="5143500" type="screen16x9"/>
   <p:notesSz cx="6858000" cy="9144000"/>
@@ -467,6 +468,11 @@
         </p:txBody>
       </p:sp>
     </p:spTree>
+    <p:extLst>
+      <p:ext uri="{BB962C8B-B14F-4D97-AF65-F5344CB8AC3E}">
+        <p14:creationId xmlns:p14="http://schemas.microsoft.com/office/powerpoint/2010/main" val="3125206718"/>
+      </p:ext>
+    </p:extLst>
   </p:cSld>
   <p:clrMap bg1="lt1" tx1="dk1" bg2="dk2" tx2="lt2" accent1="accent1" accent2="accent2" accent3="accent3" accent4="accent4" accent5="accent5" accent6="accent6" hlink="hlink" folHlink="folHlink"/>
   <p:notesStyle>
@@ -798,6 +804,11 @@
         </p:txBody>
       </p:sp>
     </p:spTree>
+    <p:extLst>
+      <p:ext uri="{BB962C8B-B14F-4D97-AF65-F5344CB8AC3E}">
+        <p14:creationId xmlns:p14="http://schemas.microsoft.com/office/powerpoint/2010/main" val="4035484829"/>
+      </p:ext>
+    </p:extLst>
   </p:cSld>
   <p:clrMapOvr>
     <a:masterClrMapping/>
@@ -902,6 +913,11 @@
         </p:txBody>
       </p:sp>
     </p:spTree>
+    <p:extLst>
+      <p:ext uri="{BB962C8B-B14F-4D97-AF65-F5344CB8AC3E}">
+        <p14:creationId xmlns:p14="http://schemas.microsoft.com/office/powerpoint/2010/main" val="3170486848"/>
+      </p:ext>
+    </p:extLst>
   </p:cSld>
   <p:clrMapOvr>
     <a:masterClrMapping/>
@@ -6024,7 +6040,7 @@
           <p:cNvPr id="2" name="Title 1">
             <a:extLst>
               <a:ext uri="{FF2B5EF4-FFF2-40B4-BE49-F238E27FC236}">
-                <a16:creationId xmlns:a16="http://schemas.microsoft.com/office/drawing/2014/main" id="{16F37AB4-DDDD-44ED-B2A7-105914802B37}"/>
+                <a16:creationId xmlns:a16="http://schemas.microsoft.com/office/drawing/2014/main" xmlns="" id="{16F37AB4-DDDD-44ED-B2A7-105914802B37}"/>
               </a:ext>
             </a:extLst>
           </p:cNvPr>
@@ -6052,7 +6068,7 @@
           <p:cNvPr id="3" name="Text Placeholder 2">
             <a:extLst>
               <a:ext uri="{FF2B5EF4-FFF2-40B4-BE49-F238E27FC236}">
-                <a16:creationId xmlns:a16="http://schemas.microsoft.com/office/drawing/2014/main" id="{8EA1E525-3D01-4D0E-AAEE-DE2216E9CA80}"/>
+                <a16:creationId xmlns:a16="http://schemas.microsoft.com/office/drawing/2014/main" xmlns="" id="{8EA1E525-3D01-4D0E-AAEE-DE2216E9CA80}"/>
               </a:ext>
             </a:extLst>
           </p:cNvPr>
@@ -6081,23 +6097,23 @@
               <a:buNone/>
             </a:pPr>
             <a:r>
-              <a:rPr lang="en" dirty="0"/>
+              <a:rPr lang="en" sz="1200" dirty="0"/>
               <a:t>-</a:t>
             </a:r>
             <a:r>
-              <a:rPr lang="en-US" dirty="0"/>
+              <a:rPr lang="en-US" sz="1200" dirty="0"/>
               <a:t>W</a:t>
             </a:r>
             <a:r>
-              <a:rPr lang="en" dirty="0"/>
+              <a:rPr lang="en" sz="1200" dirty="0"/>
               <a:t>ill be a </a:t>
             </a:r>
             <a:r>
-              <a:rPr lang="en-US" dirty="0"/>
+              <a:rPr lang="en-US" sz="1200" dirty="0"/>
               <a:t>U</a:t>
             </a:r>
             <a:r>
-              <a:rPr lang="en" dirty="0"/>
+              <a:rPr lang="en" sz="1200" dirty="0"/>
               <a:t>nity game</a:t>
             </a:r>
           </a:p>
@@ -6115,9 +6131,131 @@
               <a:buNone/>
             </a:pPr>
             <a:r>
+              <a:rPr lang="en" sz="1200" dirty="0" smtClean="0"/>
+              <a:t>-Using </a:t>
+            </a:r>
+            <a:r>
+              <a:rPr lang="en" sz="1200" dirty="0"/>
+              <a:t>C# as the scripting </a:t>
+            </a:r>
+            <a:r>
+              <a:rPr lang="en" sz="1200" dirty="0" smtClean="0"/>
+              <a:t>language</a:t>
+            </a:r>
+          </a:p>
+          <a:p>
+            <a:pPr marL="0" lvl="0" indent="0">
+              <a:lnSpc>
+                <a:spcPct val="100000"/>
+              </a:lnSpc>
+              <a:spcBef>
+                <a:spcPts val="1600"/>
+              </a:spcBef>
+              <a:spcAft>
+                <a:spcPts val="1600"/>
+              </a:spcAft>
+              <a:buNone/>
+            </a:pPr>
+            <a:r>
+              <a:rPr lang="en" sz="1200" dirty="0" smtClean="0"/>
+              <a:t>-Three types of enemies(attack patterns)</a:t>
+            </a:r>
+          </a:p>
+          <a:p>
+            <a:pPr marL="0" lvl="0" indent="0">
+              <a:lnSpc>
+                <a:spcPct val="100000"/>
+              </a:lnSpc>
+              <a:spcBef>
+                <a:spcPts val="1600"/>
+              </a:spcBef>
+              <a:spcAft>
+                <a:spcPts val="1600"/>
+              </a:spcAft>
+              <a:buNone/>
+            </a:pPr>
+            <a:r>
+              <a:rPr lang="en" sz="1200" dirty="0"/>
+              <a:t> </a:t>
+            </a:r>
+            <a:r>
+              <a:rPr lang="en" sz="1200" dirty="0" smtClean="0"/>
+              <a:t>+Normal(nothing special)</a:t>
+            </a:r>
+          </a:p>
+          <a:p>
+            <a:pPr marL="0" lvl="0" indent="0">
+              <a:lnSpc>
+                <a:spcPct val="100000"/>
+              </a:lnSpc>
+              <a:spcBef>
+                <a:spcPts val="1600"/>
+              </a:spcBef>
+              <a:spcAft>
+                <a:spcPts val="1600"/>
+              </a:spcAft>
+              <a:buNone/>
+            </a:pPr>
+            <a:r>
+              <a:rPr lang="en" sz="1200" dirty="0"/>
+              <a:t> </a:t>
+            </a:r>
+            <a:r>
+              <a:rPr lang="en" sz="1200" dirty="0" smtClean="0"/>
+              <a:t>+Elite(fast movement, low attack damage,lower health)</a:t>
+            </a:r>
+          </a:p>
+          <a:p>
+            <a:pPr marL="0" lvl="0" indent="0">
+              <a:lnSpc>
+                <a:spcPct val="100000"/>
+              </a:lnSpc>
+              <a:spcBef>
+                <a:spcPts val="1600"/>
+              </a:spcBef>
+              <a:spcAft>
+                <a:spcPts val="1600"/>
+              </a:spcAft>
+              <a:buNone/>
+            </a:pPr>
+            <a:r>
+              <a:rPr lang="en" sz="1200" dirty="0" smtClean="0"/>
+              <a:t>+Boss(slow movement, high attack damage, high health</a:t>
+            </a:r>
+          </a:p>
+          <a:p>
+            <a:pPr marL="0" lvl="0" indent="0">
+              <a:lnSpc>
+                <a:spcPct val="100000"/>
+              </a:lnSpc>
+              <a:spcBef>
+                <a:spcPts val="1600"/>
+              </a:spcBef>
+              <a:spcAft>
+                <a:spcPts val="1600"/>
+              </a:spcAft>
+              <a:buNone/>
+            </a:pPr>
+            <a:endParaRPr lang="en" dirty="0" smtClean="0"/>
+          </a:p>
+          <a:p>
+            <a:pPr marL="0" lvl="0" indent="0">
+              <a:lnSpc>
+                <a:spcPct val="100000"/>
+              </a:lnSpc>
+              <a:spcBef>
+                <a:spcPts val="1600"/>
+              </a:spcBef>
+              <a:spcAft>
+                <a:spcPts val="1600"/>
+              </a:spcAft>
+              <a:buNone/>
+            </a:pPr>
+            <a:r>
               <a:rPr lang="en" dirty="0"/>
-              <a:t>- Using C# as the scripting language</a:t>
+              <a:t> </a:t>
             </a:r>
+            <a:endParaRPr lang="en" dirty="0" smtClean="0"/>
           </a:p>
           <a:p>
             <a:pPr marL="114300" indent="0">
@@ -6131,6 +6269,163 @@
     <p:extLst>
       <p:ext uri="{BB962C8B-B14F-4D97-AF65-F5344CB8AC3E}">
         <p14:creationId xmlns:p14="http://schemas.microsoft.com/office/powerpoint/2010/main" val="3129993071"/>
+      </p:ext>
+    </p:extLst>
+  </p:cSld>
+  <p:clrMapOvr>
+    <a:masterClrMapping/>
+  </p:clrMapOvr>
+</p:sld>
+</file>
+
+<file path=ppt/slides/slide4.xml><?xml version="1.0" encoding="utf-8"?>
+<p:sld xmlns:a="http://schemas.openxmlformats.org/drawingml/2006/main" xmlns:r="http://schemas.openxmlformats.org/officeDocument/2006/relationships" xmlns:p="http://schemas.openxmlformats.org/presentationml/2006/main">
+  <p:cSld>
+    <p:spTree>
+      <p:nvGrpSpPr>
+        <p:cNvPr id="1" name=""/>
+        <p:cNvGrpSpPr/>
+        <p:nvPr/>
+      </p:nvGrpSpPr>
+      <p:grpSpPr>
+        <a:xfrm>
+          <a:off x="0" y="0"/>
+          <a:ext cx="0" cy="0"/>
+          <a:chOff x="0" y="0"/>
+          <a:chExt cx="0" cy="0"/>
+        </a:xfrm>
+      </p:grpSpPr>
+      <p:sp>
+        <p:nvSpPr>
+          <p:cNvPr id="2" name="Title 1"/>
+          <p:cNvSpPr>
+            <a:spLocks noGrp="1"/>
+          </p:cNvSpPr>
+          <p:nvPr>
+            <p:ph type="title"/>
+          </p:nvPr>
+        </p:nvSpPr>
+        <p:spPr/>
+        <p:txBody>
+          <a:bodyPr/>
+          <a:lstStyle/>
+          <a:p>
+            <a:endParaRPr lang="en-US" dirty="0"/>
+          </a:p>
+        </p:txBody>
+      </p:sp>
+      <p:sp>
+        <p:nvSpPr>
+          <p:cNvPr id="3" name="Text Placeholder 2"/>
+          <p:cNvSpPr>
+            <a:spLocks noGrp="1"/>
+          </p:cNvSpPr>
+          <p:nvPr>
+            <p:ph type="body" idx="1"/>
+          </p:nvPr>
+        </p:nvSpPr>
+        <p:spPr/>
+        <p:txBody>
+          <a:bodyPr/>
+          <a:lstStyle/>
+          <a:p>
+            <a:pPr marL="0" lvl="0" indent="0">
+              <a:lnSpc>
+                <a:spcPct val="100000"/>
+              </a:lnSpc>
+              <a:spcBef>
+                <a:spcPts val="1600"/>
+              </a:spcBef>
+              <a:spcAft>
+                <a:spcPts val="1600"/>
+              </a:spcAft>
+              <a:buNone/>
+            </a:pPr>
+            <a:r>
+              <a:rPr lang="en" dirty="0"/>
+              <a:t>-Based on player performance these things will change:</a:t>
+            </a:r>
+          </a:p>
+          <a:p>
+            <a:pPr marL="0" lvl="0" indent="0">
+              <a:lnSpc>
+                <a:spcPct val="100000"/>
+              </a:lnSpc>
+              <a:spcBef>
+                <a:spcPts val="1600"/>
+              </a:spcBef>
+              <a:spcAft>
+                <a:spcPts val="1600"/>
+              </a:spcAft>
+              <a:buNone/>
+            </a:pPr>
+            <a:r>
+              <a:rPr lang="en" dirty="0"/>
+              <a:t> +amount of enemies will increase/decrease</a:t>
+            </a:r>
+          </a:p>
+          <a:p>
+            <a:pPr marL="0" lvl="0" indent="0">
+              <a:lnSpc>
+                <a:spcPct val="100000"/>
+              </a:lnSpc>
+              <a:spcBef>
+                <a:spcPts val="1600"/>
+              </a:spcBef>
+              <a:spcAft>
+                <a:spcPts val="1600"/>
+              </a:spcAft>
+              <a:buNone/>
+            </a:pPr>
+            <a:r>
+              <a:rPr lang="en" dirty="0"/>
+              <a:t> +enemies will get </a:t>
+            </a:r>
+            <a:r>
+              <a:rPr lang="en" dirty="0" smtClean="0"/>
+              <a:t>stronger/weaker</a:t>
+            </a:r>
+            <a:endParaRPr lang="en-US" dirty="0" smtClean="0"/>
+          </a:p>
+          <a:p>
+            <a:pPr marL="114300" indent="0">
+              <a:buNone/>
+            </a:pPr>
+            <a:r>
+              <a:rPr lang="en-US" dirty="0"/>
+              <a:t>+</a:t>
+            </a:r>
+            <a:r>
+              <a:rPr lang="en-US" dirty="0" smtClean="0"/>
+              <a:t>time between enemies groups will increase/decrease</a:t>
+            </a:r>
+          </a:p>
+          <a:p>
+            <a:pPr marL="114300" indent="0">
+              <a:buNone/>
+            </a:pPr>
+            <a:endParaRPr lang="en-US" dirty="0" smtClean="0"/>
+          </a:p>
+          <a:p>
+            <a:pPr marL="114300" indent="0">
+              <a:buNone/>
+            </a:pPr>
+            <a:r>
+              <a:rPr lang="en-US" dirty="0"/>
+              <a:t>+</a:t>
+            </a:r>
+            <a:r>
+              <a:rPr lang="en-US" dirty="0" smtClean="0"/>
+              <a:t>Frequency of  ammo/health drops</a:t>
+            </a:r>
+            <a:endParaRPr lang="en-US" dirty="0"/>
+          </a:p>
+        </p:txBody>
+      </p:sp>
+    </p:spTree>
+    <p:extLst>
+      <p:ext uri="{BB962C8B-B14F-4D97-AF65-F5344CB8AC3E}">
+        <p14:creationId xmlns:p14="http://schemas.microsoft.com/office/powerpoint/2010/main" val="3857906137"/>
       </p:ext>
     </p:extLst>
   </p:cSld>

</xml_diff>